<commit_message>
added Frank to the list of speakers
</commit_message>
<xml_diff>
--- a/docs/images/speakers.pptx
+++ b/docs/images/speakers.pptx
@@ -259,7 +259,7 @@
           <a:p>
             <a:fld id="{0231A3BF-02FE-42AD-9563-0DE589E5EF61}" type="datetimeFigureOut">
               <a:rPr lang="en-US" smtClean="0"/>
-              <a:t>6/8/22</a:t>
+              <a:t>6/14/22</a:t>
             </a:fld>
             <a:endParaRPr lang="en-US"/>
           </a:p>
@@ -457,7 +457,7 @@
           <a:p>
             <a:fld id="{0231A3BF-02FE-42AD-9563-0DE589E5EF61}" type="datetimeFigureOut">
               <a:rPr lang="en-US" smtClean="0"/>
-              <a:t>6/8/22</a:t>
+              <a:t>6/14/22</a:t>
             </a:fld>
             <a:endParaRPr lang="en-US"/>
           </a:p>
@@ -665,7 +665,7 @@
           <a:p>
             <a:fld id="{0231A3BF-02FE-42AD-9563-0DE589E5EF61}" type="datetimeFigureOut">
               <a:rPr lang="en-US" smtClean="0"/>
-              <a:t>6/8/22</a:t>
+              <a:t>6/14/22</a:t>
             </a:fld>
             <a:endParaRPr lang="en-US"/>
           </a:p>
@@ -863,7 +863,7 @@
           <a:p>
             <a:fld id="{0231A3BF-02FE-42AD-9563-0DE589E5EF61}" type="datetimeFigureOut">
               <a:rPr lang="en-US" smtClean="0"/>
-              <a:t>6/8/22</a:t>
+              <a:t>6/14/22</a:t>
             </a:fld>
             <a:endParaRPr lang="en-US"/>
           </a:p>
@@ -1138,7 +1138,7 @@
           <a:p>
             <a:fld id="{0231A3BF-02FE-42AD-9563-0DE589E5EF61}" type="datetimeFigureOut">
               <a:rPr lang="en-US" smtClean="0"/>
-              <a:t>6/8/22</a:t>
+              <a:t>6/14/22</a:t>
             </a:fld>
             <a:endParaRPr lang="en-US"/>
           </a:p>
@@ -1403,7 +1403,7 @@
           <a:p>
             <a:fld id="{0231A3BF-02FE-42AD-9563-0DE589E5EF61}" type="datetimeFigureOut">
               <a:rPr lang="en-US" smtClean="0"/>
-              <a:t>6/8/22</a:t>
+              <a:t>6/14/22</a:t>
             </a:fld>
             <a:endParaRPr lang="en-US"/>
           </a:p>
@@ -1815,7 +1815,7 @@
           <a:p>
             <a:fld id="{0231A3BF-02FE-42AD-9563-0DE589E5EF61}" type="datetimeFigureOut">
               <a:rPr lang="en-US" smtClean="0"/>
-              <a:t>6/8/22</a:t>
+              <a:t>6/14/22</a:t>
             </a:fld>
             <a:endParaRPr lang="en-US"/>
           </a:p>
@@ -1956,7 +1956,7 @@
           <a:p>
             <a:fld id="{0231A3BF-02FE-42AD-9563-0DE589E5EF61}" type="datetimeFigureOut">
               <a:rPr lang="en-US" smtClean="0"/>
-              <a:t>6/8/22</a:t>
+              <a:t>6/14/22</a:t>
             </a:fld>
             <a:endParaRPr lang="en-US"/>
           </a:p>
@@ -2069,7 +2069,7 @@
           <a:p>
             <a:fld id="{0231A3BF-02FE-42AD-9563-0DE589E5EF61}" type="datetimeFigureOut">
               <a:rPr lang="en-US" smtClean="0"/>
-              <a:t>6/8/22</a:t>
+              <a:t>6/14/22</a:t>
             </a:fld>
             <a:endParaRPr lang="en-US"/>
           </a:p>
@@ -2380,7 +2380,7 @@
           <a:p>
             <a:fld id="{0231A3BF-02FE-42AD-9563-0DE589E5EF61}" type="datetimeFigureOut">
               <a:rPr lang="en-US" smtClean="0"/>
-              <a:t>6/8/22</a:t>
+              <a:t>6/14/22</a:t>
             </a:fld>
             <a:endParaRPr lang="en-US"/>
           </a:p>
@@ -2668,7 +2668,7 @@
           <a:p>
             <a:fld id="{0231A3BF-02FE-42AD-9563-0DE589E5EF61}" type="datetimeFigureOut">
               <a:rPr lang="en-US" smtClean="0"/>
-              <a:t>6/8/22</a:t>
+              <a:t>6/14/22</a:t>
             </a:fld>
             <a:endParaRPr lang="en-US"/>
           </a:p>
@@ -2909,7 +2909,7 @@
           <a:p>
             <a:fld id="{0231A3BF-02FE-42AD-9563-0DE589E5EF61}" type="datetimeFigureOut">
               <a:rPr lang="en-US" smtClean="0"/>
-              <a:t>6/8/22</a:t>
+              <a:t>6/14/22</a:t>
             </a:fld>
             <a:endParaRPr lang="en-US"/>
           </a:p>
@@ -3729,7 +3729,7 @@
         </p:blipFill>
         <p:spPr bwMode="auto">
           <a:xfrm>
-            <a:off x="2055632" y="4836561"/>
+            <a:off x="3473464" y="4836561"/>
             <a:ext cx="2469641" cy="1645920"/>
           </a:xfrm>
           <a:prstGeom prst="roundRect">
@@ -3776,7 +3776,7 @@
         </p:blipFill>
         <p:spPr bwMode="auto">
           <a:xfrm>
-            <a:off x="5816998" y="4836561"/>
+            <a:off x="6632823" y="4826676"/>
             <a:ext cx="1645920" cy="1645920"/>
           </a:xfrm>
           <a:prstGeom prst="roundRect">
@@ -3823,7 +3823,7 @@
         </p:blipFill>
         <p:spPr bwMode="auto">
           <a:xfrm>
-            <a:off x="8754643" y="4836561"/>
+            <a:off x="9299172" y="4836561"/>
             <a:ext cx="1645920" cy="1645920"/>
           </a:xfrm>
           <a:prstGeom prst="roundRect">
@@ -4160,7 +4160,7 @@
         </p:nvSpPr>
         <p:spPr>
           <a:xfrm>
-            <a:off x="2182423" y="6472596"/>
+            <a:off x="3600255" y="6472596"/>
             <a:ext cx="2342850" cy="369332"/>
           </a:xfrm>
           <a:prstGeom prst="rect">
@@ -4200,7 +4200,7 @@
         </p:nvSpPr>
         <p:spPr>
           <a:xfrm>
-            <a:off x="5757094" y="6472596"/>
+            <a:off x="6572919" y="6462711"/>
             <a:ext cx="1975207" cy="369332"/>
           </a:xfrm>
           <a:prstGeom prst="rect">
@@ -4235,7 +4235,7 @@
         </p:nvSpPr>
         <p:spPr>
           <a:xfrm>
-            <a:off x="8754643" y="6477075"/>
+            <a:off x="9299172" y="6477075"/>
             <a:ext cx="1779998" cy="369332"/>
           </a:xfrm>
           <a:prstGeom prst="rect">
@@ -4256,6 +4256,86 @@
           </a:p>
         </p:txBody>
       </p:sp>
+      <p:sp>
+        <p:nvSpPr>
+          <p:cNvPr id="24" name="TextBox 23">
+            <a:extLst>
+              <a:ext uri="{FF2B5EF4-FFF2-40B4-BE49-F238E27FC236}">
+                <a16:creationId xmlns:a16="http://schemas.microsoft.com/office/drawing/2014/main" id="{8A70C2A4-A051-ADB3-4459-ABE0D6680306}"/>
+              </a:ext>
+            </a:extLst>
+          </p:cNvPr>
+          <p:cNvSpPr txBox="1"/>
+          <p:nvPr/>
+        </p:nvSpPr>
+        <p:spPr>
+          <a:xfrm>
+            <a:off x="851614" y="6462711"/>
+            <a:ext cx="2342850" cy="369332"/>
+          </a:xfrm>
+          <a:prstGeom prst="rect">
+            <a:avLst/>
+          </a:prstGeom>
+          <a:noFill/>
+        </p:spPr>
+        <p:txBody>
+          <a:bodyPr wrap="square">
+            <a:spAutoFit/>
+          </a:bodyPr>
+          <a:lstStyle/>
+          <a:p>
+            <a:r>
+              <a:rPr lang="en-US" dirty="0"/>
+              <a:t>Frank. Muller-Karger</a:t>
+            </a:r>
+          </a:p>
+        </p:txBody>
+      </p:sp>
+      <p:pic>
+        <p:nvPicPr>
+          <p:cNvPr id="1026" name="Picture 2" descr="U.S. Integrated Ocean Observing System - Dr. Frank Muller-Karger,  University of South Florida and lead investigator on the Sanctuaries Marine  Biodiversity Observation Network (MBON) project recently presented at the  workshop “Conserving the">
+            <a:extLst>
+              <a:ext uri="{FF2B5EF4-FFF2-40B4-BE49-F238E27FC236}">
+                <a16:creationId xmlns:a16="http://schemas.microsoft.com/office/drawing/2014/main" id="{2F0E08C2-8462-B2AB-954F-F71E7C696678}"/>
+              </a:ext>
+            </a:extLst>
+          </p:cNvPr>
+          <p:cNvPicPr>
+            <a:picLocks noChangeAspect="1" noChangeArrowheads="1"/>
+          </p:cNvPicPr>
+          <p:nvPr/>
+        </p:nvPicPr>
+        <p:blipFill rotWithShape="1">
+          <a:blip r:embed="rId13">
+            <a:extLst>
+              <a:ext uri="{28A0092B-C50C-407E-A947-70E740481C1C}">
+                <a14:useLocalDpi xmlns:a14="http://schemas.microsoft.com/office/drawing/2010/main" val="0"/>
+              </a:ext>
+            </a:extLst>
+          </a:blip>
+          <a:srcRect b="21824"/>
+          <a:stretch/>
+        </p:blipFill>
+        <p:spPr bwMode="auto">
+          <a:xfrm>
+            <a:off x="1038705" y="4836559"/>
+            <a:ext cx="1723358" cy="1645921"/>
+          </a:xfrm>
+          <a:prstGeom prst="roundRect">
+            <a:avLst/>
+          </a:prstGeom>
+          <a:noFill/>
+          <a:extLst>
+            <a:ext uri="{909E8E84-426E-40DD-AFC4-6F175D3DCCD1}">
+              <a14:hiddenFill xmlns:a14="http://schemas.microsoft.com/office/drawing/2010/main">
+                <a:solidFill>
+                  <a:srgbClr val="FFFFFF"/>
+                </a:solidFill>
+              </a14:hiddenFill>
+            </a:ext>
+          </a:extLst>
+        </p:spPr>
+      </p:pic>
     </p:spTree>
     <p:extLst>
       <p:ext uri="{BB962C8B-B14F-4D97-AF65-F5344CB8AC3E}">

</xml_diff>